<commit_message>
Fix typo. Updated PPT
</commit_message>
<xml_diff>
--- a/images/DTC Glossary Images.pptx
+++ b/images/DTC Glossary Images.pptx
@@ -287,7 +287,7 @@
           <a:p>
             <a:fld id="{0F00057F-F545-4124-B869-FEE50277A6C1}" type="datetimeFigureOut">
               <a:rPr lang="en-US" smtClean="0"/>
-              <a:t>3/5/2021</a:t>
+              <a:t>3/8/2021</a:t>
             </a:fld>
             <a:endParaRPr lang="en-US"/>
           </a:p>
@@ -448,7 +448,7 @@
           <a:p>
             <a:fld id="{6BF04978-D66A-441D-AAA4-8DA7AE7C797C}" type="datetime1">
               <a:rPr lang="en-US" smtClean="0"/>
-              <a:t>3/5/2021</a:t>
+              <a:t>3/8/2021</a:t>
             </a:fld>
             <a:endParaRPr lang="en-US"/>
           </a:p>
@@ -922,7 +922,7 @@
           <a:p>
             <a:fld id="{A44A6C12-8802-481D-B329-FC58F760DE11}" type="datetime1">
               <a:rPr lang="en-US" smtClean="0"/>
-              <a:t>3/5/2021</a:t>
+              <a:t>3/8/2021</a:t>
             </a:fld>
             <a:endParaRPr lang="en-US"/>
           </a:p>
@@ -1911,7 +1911,7 @@
           <a:p>
             <a:fld id="{9E9D4424-898E-4C95-B84F-5235E02059BA}" type="datetime1">
               <a:rPr lang="en-US" smtClean="0"/>
-              <a:t>3/5/2021</a:t>
+              <a:t>3/8/2021</a:t>
             </a:fld>
             <a:endParaRPr lang="en-US"/>
           </a:p>
@@ -2264,7 +2264,7 @@
           <a:p>
             <a:fld id="{331BDA9A-DF2E-49C1-95A2-4F5F4AA1116C}" type="datetime1">
               <a:rPr lang="en-US" smtClean="0"/>
-              <a:t>3/5/2021</a:t>
+              <a:t>3/8/2021</a:t>
             </a:fld>
             <a:endParaRPr lang="en-US"/>
           </a:p>
@@ -3848,7 +3848,7 @@
           <a:p>
             <a:fld id="{E86231B4-8799-4095-A9F6-88F13DCCFFE2}" type="datetime1">
               <a:rPr lang="en-US" smtClean="0"/>
-              <a:t>3/5/2021</a:t>
+              <a:t>3/8/2021</a:t>
             </a:fld>
             <a:endParaRPr lang="en-US"/>
           </a:p>
@@ -4668,7 +4668,7 @@
           <a:p>
             <a:fld id="{CD06C1EE-673C-4BF7-B8EE-4F142CE073E2}" type="datetime1">
               <a:rPr lang="en-US" smtClean="0"/>
-              <a:t>3/5/2021</a:t>
+              <a:t>3/8/2021</a:t>
             </a:fld>
             <a:endParaRPr lang="en-US"/>
           </a:p>

</xml_diff>

<commit_message>
Tweaks in response to Tiger Team feedback
</commit_message>
<xml_diff>
--- a/images/DTC Glossary Images.pptx
+++ b/images/DTC Glossary Images.pptx
@@ -287,7 +287,7 @@
           <a:p>
             <a:fld id="{0F00057F-F545-4124-B869-FEE50277A6C1}" type="datetimeFigureOut">
               <a:rPr lang="en-US" smtClean="0"/>
-              <a:t>3/8/2021</a:t>
+              <a:t>3/11/2021</a:t>
             </a:fld>
             <a:endParaRPr lang="en-US"/>
           </a:p>
@@ -448,7 +448,7 @@
           <a:p>
             <a:fld id="{6BF04978-D66A-441D-AAA4-8DA7AE7C797C}" type="datetime1">
               <a:rPr lang="en-US" smtClean="0"/>
-              <a:t>3/8/2021</a:t>
+              <a:t>3/11/2021</a:t>
             </a:fld>
             <a:endParaRPr lang="en-US"/>
           </a:p>
@@ -922,7 +922,7 @@
           <a:p>
             <a:fld id="{A44A6C12-8802-481D-B329-FC58F760DE11}" type="datetime1">
               <a:rPr lang="en-US" smtClean="0"/>
-              <a:t>3/8/2021</a:t>
+              <a:t>3/11/2021</a:t>
             </a:fld>
             <a:endParaRPr lang="en-US"/>
           </a:p>
@@ -1911,7 +1911,7 @@
           <a:p>
             <a:fld id="{9E9D4424-898E-4C95-B84F-5235E02059BA}" type="datetime1">
               <a:rPr lang="en-US" smtClean="0"/>
-              <a:t>3/8/2021</a:t>
+              <a:t>3/11/2021</a:t>
             </a:fld>
             <a:endParaRPr lang="en-US"/>
           </a:p>
@@ -2264,7 +2264,7 @@
           <a:p>
             <a:fld id="{331BDA9A-DF2E-49C1-95A2-4F5F4AA1116C}" type="datetime1">
               <a:rPr lang="en-US" smtClean="0"/>
-              <a:t>3/8/2021</a:t>
+              <a:t>3/11/2021</a:t>
             </a:fld>
             <a:endParaRPr lang="en-US"/>
           </a:p>
@@ -3848,7 +3848,7 @@
           <a:p>
             <a:fld id="{E86231B4-8799-4095-A9F6-88F13DCCFFE2}" type="datetime1">
               <a:rPr lang="en-US" smtClean="0"/>
-              <a:t>3/8/2021</a:t>
+              <a:t>3/11/2021</a:t>
             </a:fld>
             <a:endParaRPr lang="en-US"/>
           </a:p>
@@ -4668,7 +4668,7 @@
           <a:p>
             <a:fld id="{CD06C1EE-673C-4BF7-B8EE-4F142CE073E2}" type="datetime1">
               <a:rPr lang="en-US" smtClean="0"/>
-              <a:t>3/8/2021</a:t>
+              <a:t>3/11/2021</a:t>
             </a:fld>
             <a:endParaRPr lang="en-US"/>
           </a:p>
@@ -21352,7 +21352,7 @@
                 <a:ea typeface="+mn-ea"/>
                 <a:cs typeface="+mn-cs"/>
               </a:rPr>
-              <a:t>representing attributes of and states of entities and processes at one or more times</a:t>
+              <a:t>Typically representing states and attributes of entities and processes at one or more times</a:t>
             </a:r>
           </a:p>
         </p:txBody>
@@ -22405,8 +22405,8 @@
         </p:nvSpPr>
         <p:spPr>
           <a:xfrm>
-            <a:off x="7980625" y="4791010"/>
-            <a:ext cx="2677850" cy="646331"/>
+            <a:off x="7980624" y="4791010"/>
+            <a:ext cx="2807691" cy="1200329"/>
           </a:xfrm>
           <a:prstGeom prst="rect">
             <a:avLst/>
@@ -22450,7 +22450,41 @@
                 <a:ea typeface="+mn-ea"/>
                 <a:cs typeface="+mn-cs"/>
               </a:rPr>
-              <a:t>Representing processes as a function of time</a:t>
+              <a:t>Typically representing processes </a:t>
+            </a:r>
+            <a:r>
+              <a:rPr kumimoji="0" lang="en-US" sz="1800" b="0" i="0" u="none" strike="noStrike" kern="1200" cap="none" spc="0" normalizeH="0" noProof="0" dirty="0">
+                <a:ln>
+                  <a:noFill/>
+                </a:ln>
+                <a:solidFill>
+                  <a:srgbClr val="002A44"/>
+                </a:solidFill>
+                <a:effectLst/>
+                <a:uLnTx/>
+                <a:uFillTx/>
+                <a:latin typeface="Arial"/>
+                <a:ea typeface="+mn-ea"/>
+                <a:cs typeface="+mn-cs"/>
+              </a:rPr>
+              <a:t>where states and attributes vary </a:t>
+            </a:r>
+            <a:r>
+              <a:rPr kumimoji="0" lang="en-US" sz="1800" b="0" i="0" u="none" strike="noStrike" kern="1200" cap="none" spc="0" normalizeH="0" baseline="0" noProof="0" dirty="0">
+                <a:ln>
+                  <a:noFill/>
+                </a:ln>
+                <a:solidFill>
+                  <a:srgbClr val="002A44"/>
+                </a:solidFill>
+                <a:effectLst/>
+                <a:uLnTx/>
+                <a:uFillTx/>
+                <a:latin typeface="Arial"/>
+                <a:ea typeface="+mn-ea"/>
+                <a:cs typeface="+mn-cs"/>
+              </a:rPr>
+              <a:t>as a function of time</a:t>
             </a:r>
           </a:p>
         </p:txBody>

</xml_diff>